<commit_message>
updated slides to remove animations
</commit_message>
<xml_diff>
--- a/Presentations/day-02.pptx
+++ b/Presentations/day-02.pptx
@@ -278,7 +278,7 @@
           <a:p>
             <a:fld id="{ECE6AC27-787C-AD4B-9476-AB5182ACD8EE}" type="datetimeFigureOut">
               <a:rPr lang="en-US" smtClean="0"/>
-              <a:t>1/26/15</a:t>
+              <a:t>1/29/15</a:t>
             </a:fld>
             <a:endParaRPr lang="en-US"/>
           </a:p>
@@ -788,7 +788,7 @@
           <a:p>
             <a:fld id="{7A508B03-06C9-FB45-B0B2-6E485A38F6C6}" type="datetimeFigureOut">
               <a:rPr lang="en-US" smtClean="0"/>
-              <a:t>1/26/15</a:t>
+              <a:t>1/29/15</a:t>
             </a:fld>
             <a:endParaRPr lang="en-US"/>
           </a:p>
@@ -958,7 +958,7 @@
           <a:p>
             <a:fld id="{7A508B03-06C9-FB45-B0B2-6E485A38F6C6}" type="datetimeFigureOut">
               <a:rPr lang="en-US" smtClean="0"/>
-              <a:t>1/26/15</a:t>
+              <a:t>1/29/15</a:t>
             </a:fld>
             <a:endParaRPr lang="en-US"/>
           </a:p>
@@ -1138,7 +1138,7 @@
           <a:p>
             <a:fld id="{7A508B03-06C9-FB45-B0B2-6E485A38F6C6}" type="datetimeFigureOut">
               <a:rPr lang="en-US" smtClean="0"/>
-              <a:t>1/26/15</a:t>
+              <a:t>1/29/15</a:t>
             </a:fld>
             <a:endParaRPr lang="en-US"/>
           </a:p>
@@ -3147,7 +3147,7 @@
           <a:p>
             <a:fld id="{7A508B03-06C9-FB45-B0B2-6E485A38F6C6}" type="datetimeFigureOut">
               <a:rPr lang="en-US" smtClean="0"/>
-              <a:t>1/26/15</a:t>
+              <a:t>1/29/15</a:t>
             </a:fld>
             <a:endParaRPr lang="en-US"/>
           </a:p>
@@ -3994,7 +3994,7 @@
           <a:p>
             <a:fld id="{7A508B03-06C9-FB45-B0B2-6E485A38F6C6}" type="datetimeFigureOut">
               <a:rPr lang="en-US" smtClean="0"/>
-              <a:t>1/26/15</a:t>
+              <a:t>1/29/15</a:t>
             </a:fld>
             <a:endParaRPr lang="en-US"/>
           </a:p>
@@ -4282,7 +4282,7 @@
           <a:p>
             <a:fld id="{7A508B03-06C9-FB45-B0B2-6E485A38F6C6}" type="datetimeFigureOut">
               <a:rPr lang="en-US" smtClean="0"/>
-              <a:t>1/26/15</a:t>
+              <a:t>1/29/15</a:t>
             </a:fld>
             <a:endParaRPr lang="en-US"/>
           </a:p>
@@ -4704,7 +4704,7 @@
           <a:p>
             <a:fld id="{7A508B03-06C9-FB45-B0B2-6E485A38F6C6}" type="datetimeFigureOut">
               <a:rPr lang="en-US" smtClean="0"/>
-              <a:t>1/26/15</a:t>
+              <a:t>1/29/15</a:t>
             </a:fld>
             <a:endParaRPr lang="en-US"/>
           </a:p>
@@ -4822,7 +4822,7 @@
           <a:p>
             <a:fld id="{7A508B03-06C9-FB45-B0B2-6E485A38F6C6}" type="datetimeFigureOut">
               <a:rPr lang="en-US" smtClean="0"/>
-              <a:t>1/26/15</a:t>
+              <a:t>1/29/15</a:t>
             </a:fld>
             <a:endParaRPr lang="en-US"/>
           </a:p>
@@ -4917,7 +4917,7 @@
           <a:p>
             <a:fld id="{7A508B03-06C9-FB45-B0B2-6E485A38F6C6}" type="datetimeFigureOut">
               <a:rPr lang="en-US" smtClean="0"/>
-              <a:t>1/26/15</a:t>
+              <a:t>1/29/15</a:t>
             </a:fld>
             <a:endParaRPr lang="en-US"/>
           </a:p>
@@ -5194,7 +5194,7 @@
           <a:p>
             <a:fld id="{7A508B03-06C9-FB45-B0B2-6E485A38F6C6}" type="datetimeFigureOut">
               <a:rPr lang="en-US" smtClean="0"/>
-              <a:t>1/26/15</a:t>
+              <a:t>1/29/15</a:t>
             </a:fld>
             <a:endParaRPr lang="en-US"/>
           </a:p>
@@ -5447,7 +5447,7 @@
           <a:p>
             <a:fld id="{7A508B03-06C9-FB45-B0B2-6E485A38F6C6}" type="datetimeFigureOut">
               <a:rPr lang="en-US" smtClean="0"/>
-              <a:t>1/26/15</a:t>
+              <a:t>1/29/15</a:t>
             </a:fld>
             <a:endParaRPr lang="en-US"/>
           </a:p>
@@ -5660,7 +5660,7 @@
           <a:p>
             <a:fld id="{7A508B03-06C9-FB45-B0B2-6E485A38F6C6}" type="datetimeFigureOut">
               <a:rPr lang="en-US" smtClean="0"/>
-              <a:t>1/26/15</a:t>
+              <a:t>1/29/15</a:t>
             </a:fld>
             <a:endParaRPr lang="en-US"/>
           </a:p>
@@ -6950,14 +6950,21 @@
   <p:clrMapOvr>
     <a:masterClrMapping/>
   </p:clrMapOvr>
-  <mc:AlternateContent xmlns:mc="http://schemas.openxmlformats.org/markup-compatibility/2006">
-    <mc:Choice xmlns:p14="http://schemas.microsoft.com/office/powerpoint/2010/main" Requires="p14">
+  <mc:AlternateContent xmlns:mc="http://schemas.openxmlformats.org/markup-compatibility/2006" xmlns:p14="http://schemas.microsoft.com/office/powerpoint/2010/main">
+    <mc:Choice Requires="p14">
       <p:transition spd="slow" p14:dur="2000"/>
     </mc:Choice>
-    <mc:Fallback>
+    <mc:Fallback xmlns="">
       <p:transition xmlns:p14="http://schemas.microsoft.com/office/powerpoint/2010/main" spd="slow"/>
     </mc:Fallback>
   </mc:AlternateContent>
+  <p:timing>
+    <p:tnLst>
+      <p:par>
+        <p:cTn xmlns:p14="http://schemas.microsoft.com/office/powerpoint/2010/main" id="1" dur="indefinite" restart="never" nodeType="tmRoot"/>
+      </p:par>
+    </p:tnLst>
+  </p:timing>
 </p:sld>
 </file>
 
@@ -7081,14 +7088,21 @@
   <p:clrMapOvr>
     <a:masterClrMapping/>
   </p:clrMapOvr>
-  <mc:AlternateContent xmlns:mc="http://schemas.openxmlformats.org/markup-compatibility/2006">
-    <mc:Choice xmlns:p14="http://schemas.microsoft.com/office/powerpoint/2010/main" Requires="p14">
+  <mc:AlternateContent xmlns:mc="http://schemas.openxmlformats.org/markup-compatibility/2006" xmlns:p14="http://schemas.microsoft.com/office/powerpoint/2010/main">
+    <mc:Choice Requires="p14">
       <p:transition spd="slow" p14:dur="2000"/>
     </mc:Choice>
-    <mc:Fallback>
+    <mc:Fallback xmlns="">
       <p:transition xmlns:p14="http://schemas.microsoft.com/office/powerpoint/2010/main" spd="slow"/>
     </mc:Fallback>
   </mc:AlternateContent>
+  <p:timing>
+    <p:tnLst>
+      <p:par>
+        <p:cTn xmlns:p14="http://schemas.microsoft.com/office/powerpoint/2010/main" id="1" dur="indefinite" restart="never" nodeType="tmRoot"/>
+      </p:par>
+    </p:tnLst>
+  </p:timing>
 </p:sld>
 </file>
 
@@ -7205,14 +7219,21 @@
   <p:clrMapOvr>
     <a:masterClrMapping/>
   </p:clrMapOvr>
-  <mc:AlternateContent xmlns:mc="http://schemas.openxmlformats.org/markup-compatibility/2006">
-    <mc:Choice xmlns:p14="http://schemas.microsoft.com/office/powerpoint/2010/main" Requires="p14">
+  <mc:AlternateContent xmlns:mc="http://schemas.openxmlformats.org/markup-compatibility/2006" xmlns:p14="http://schemas.microsoft.com/office/powerpoint/2010/main">
+    <mc:Choice Requires="p14">
       <p:transition spd="slow" p14:dur="2000"/>
     </mc:Choice>
-    <mc:Fallback>
+    <mc:Fallback xmlns="">
       <p:transition xmlns:p14="http://schemas.microsoft.com/office/powerpoint/2010/main" spd="slow"/>
     </mc:Fallback>
   </mc:AlternateContent>
+  <p:timing>
+    <p:tnLst>
+      <p:par>
+        <p:cTn xmlns:p14="http://schemas.microsoft.com/office/powerpoint/2010/main" id="1" dur="indefinite" restart="never" nodeType="tmRoot"/>
+      </p:par>
+    </p:tnLst>
+  </p:timing>
 </p:sld>
 </file>
 
@@ -7316,14 +7337,21 @@
   <p:clrMapOvr>
     <a:masterClrMapping/>
   </p:clrMapOvr>
-  <mc:AlternateContent xmlns:mc="http://schemas.openxmlformats.org/markup-compatibility/2006">
-    <mc:Choice xmlns:p14="http://schemas.microsoft.com/office/powerpoint/2010/main" Requires="p14">
+  <mc:AlternateContent xmlns:mc="http://schemas.openxmlformats.org/markup-compatibility/2006" xmlns:p14="http://schemas.microsoft.com/office/powerpoint/2010/main">
+    <mc:Choice Requires="p14">
       <p:transition spd="slow" p14:dur="2000"/>
     </mc:Choice>
-    <mc:Fallback>
+    <mc:Fallback xmlns="">
       <p:transition xmlns:p14="http://schemas.microsoft.com/office/powerpoint/2010/main" spd="slow"/>
     </mc:Fallback>
   </mc:AlternateContent>
+  <p:timing>
+    <p:tnLst>
+      <p:par>
+        <p:cTn xmlns:p14="http://schemas.microsoft.com/office/powerpoint/2010/main" id="1" dur="indefinite" restart="never" nodeType="tmRoot"/>
+      </p:par>
+    </p:tnLst>
+  </p:timing>
 </p:sld>
 </file>
 
@@ -7434,14 +7462,21 @@
   <p:clrMapOvr>
     <a:masterClrMapping/>
   </p:clrMapOvr>
-  <mc:AlternateContent xmlns:mc="http://schemas.openxmlformats.org/markup-compatibility/2006">
-    <mc:Choice xmlns:p14="http://schemas.microsoft.com/office/powerpoint/2010/main" Requires="p14">
+  <mc:AlternateContent xmlns:mc="http://schemas.openxmlformats.org/markup-compatibility/2006" xmlns:p14="http://schemas.microsoft.com/office/powerpoint/2010/main">
+    <mc:Choice Requires="p14">
       <p:transition spd="slow" p14:dur="2000"/>
     </mc:Choice>
-    <mc:Fallback>
+    <mc:Fallback xmlns="">
       <p:transition xmlns:p14="http://schemas.microsoft.com/office/powerpoint/2010/main" spd="slow"/>
     </mc:Fallback>
   </mc:AlternateContent>
+  <p:timing>
+    <p:tnLst>
+      <p:par>
+        <p:cTn xmlns:p14="http://schemas.microsoft.com/office/powerpoint/2010/main" id="1" dur="indefinite" restart="never" nodeType="tmRoot"/>
+      </p:par>
+    </p:tnLst>
+  </p:timing>
 </p:sld>
 </file>
 
@@ -7538,14 +7573,21 @@
   <p:clrMapOvr>
     <a:masterClrMapping/>
   </p:clrMapOvr>
-  <mc:AlternateContent xmlns:mc="http://schemas.openxmlformats.org/markup-compatibility/2006">
-    <mc:Choice xmlns:p14="http://schemas.microsoft.com/office/powerpoint/2010/main" Requires="p14">
+  <mc:AlternateContent xmlns:mc="http://schemas.openxmlformats.org/markup-compatibility/2006" xmlns:p14="http://schemas.microsoft.com/office/powerpoint/2010/main">
+    <mc:Choice Requires="p14">
       <p:transition spd="slow" p14:dur="2000"/>
     </mc:Choice>
-    <mc:Fallback>
+    <mc:Fallback xmlns="">
       <p:transition xmlns:p14="http://schemas.microsoft.com/office/powerpoint/2010/main" spd="slow"/>
     </mc:Fallback>
   </mc:AlternateContent>
+  <p:timing>
+    <p:tnLst>
+      <p:par>
+        <p:cTn xmlns:p14="http://schemas.microsoft.com/office/powerpoint/2010/main" id="1" dur="indefinite" restart="never" nodeType="tmRoot"/>
+      </p:par>
+    </p:tnLst>
+  </p:timing>
 </p:sld>
 </file>
 
@@ -7683,14 +7725,21 @@
   <p:clrMapOvr>
     <a:masterClrMapping/>
   </p:clrMapOvr>
-  <mc:AlternateContent xmlns:mc="http://schemas.openxmlformats.org/markup-compatibility/2006">
-    <mc:Choice xmlns:p14="http://schemas.microsoft.com/office/powerpoint/2010/main" Requires="p14">
+  <mc:AlternateContent xmlns:mc="http://schemas.openxmlformats.org/markup-compatibility/2006" xmlns:p14="http://schemas.microsoft.com/office/powerpoint/2010/main">
+    <mc:Choice Requires="p14">
       <p:transition spd="slow" p14:dur="2000"/>
     </mc:Choice>
-    <mc:Fallback>
+    <mc:Fallback xmlns="">
       <p:transition xmlns:p14="http://schemas.microsoft.com/office/powerpoint/2010/main" spd="slow"/>
     </mc:Fallback>
   </mc:AlternateContent>
+  <p:timing>
+    <p:tnLst>
+      <p:par>
+        <p:cTn xmlns:p14="http://schemas.microsoft.com/office/powerpoint/2010/main" id="1" dur="indefinite" restart="never" nodeType="tmRoot"/>
+      </p:par>
+    </p:tnLst>
+  </p:timing>
 </p:sld>
 </file>
 
@@ -7810,14 +7859,21 @@
   <p:clrMapOvr>
     <a:masterClrMapping/>
   </p:clrMapOvr>
-  <mc:AlternateContent xmlns:mc="http://schemas.openxmlformats.org/markup-compatibility/2006">
-    <mc:Choice xmlns:p14="http://schemas.microsoft.com/office/powerpoint/2010/main" Requires="p14">
+  <mc:AlternateContent xmlns:mc="http://schemas.openxmlformats.org/markup-compatibility/2006" xmlns:p14="http://schemas.microsoft.com/office/powerpoint/2010/main">
+    <mc:Choice Requires="p14">
       <p:transition spd="slow" p14:dur="2000"/>
     </mc:Choice>
-    <mc:Fallback>
+    <mc:Fallback xmlns="">
       <p:transition xmlns:p14="http://schemas.microsoft.com/office/powerpoint/2010/main" spd="slow"/>
     </mc:Fallback>
   </mc:AlternateContent>
+  <p:timing>
+    <p:tnLst>
+      <p:par>
+        <p:cTn xmlns:p14="http://schemas.microsoft.com/office/powerpoint/2010/main" id="1" dur="indefinite" restart="never" nodeType="tmRoot"/>
+      </p:par>
+    </p:tnLst>
+  </p:timing>
 </p:sld>
 </file>
 
@@ -7879,6 +7935,13 @@
       <p:transition xmlns:p14="http://schemas.microsoft.com/office/powerpoint/2010/main" spd="slow"/>
     </mc:Fallback>
   </mc:AlternateContent>
+  <p:timing>
+    <p:tnLst>
+      <p:par>
+        <p:cTn xmlns:p14="http://schemas.microsoft.com/office/powerpoint/2010/main" id="1" dur="indefinite" restart="never" nodeType="tmRoot"/>
+      </p:par>
+    </p:tnLst>
+  </p:timing>
 </p:sld>
 </file>
 
@@ -7982,14 +8045,21 @@
   <p:clrMapOvr>
     <a:masterClrMapping/>
   </p:clrMapOvr>
-  <mc:AlternateContent xmlns:mc="http://schemas.openxmlformats.org/markup-compatibility/2006">
-    <mc:Choice xmlns:p14="http://schemas.microsoft.com/office/powerpoint/2010/main" Requires="p14">
+  <mc:AlternateContent xmlns:mc="http://schemas.openxmlformats.org/markup-compatibility/2006" xmlns:p14="http://schemas.microsoft.com/office/powerpoint/2010/main">
+    <mc:Choice Requires="p14">
       <p:transition spd="slow" p14:dur="2000"/>
     </mc:Choice>
-    <mc:Fallback>
+    <mc:Fallback xmlns="">
       <p:transition xmlns:p14="http://schemas.microsoft.com/office/powerpoint/2010/main" spd="slow"/>
     </mc:Fallback>
   </mc:AlternateContent>
+  <p:timing>
+    <p:tnLst>
+      <p:par>
+        <p:cTn xmlns:p14="http://schemas.microsoft.com/office/powerpoint/2010/main" id="1" dur="indefinite" restart="never" nodeType="tmRoot"/>
+      </p:par>
+    </p:tnLst>
+  </p:timing>
 </p:sld>
 </file>
 
@@ -8146,14 +8216,21 @@
   <p:clrMapOvr>
     <a:masterClrMapping/>
   </p:clrMapOvr>
-  <mc:AlternateContent xmlns:mc="http://schemas.openxmlformats.org/markup-compatibility/2006">
-    <mc:Choice xmlns:p14="http://schemas.microsoft.com/office/powerpoint/2010/main" Requires="p14">
+  <mc:AlternateContent xmlns:mc="http://schemas.openxmlformats.org/markup-compatibility/2006" xmlns:p14="http://schemas.microsoft.com/office/powerpoint/2010/main">
+    <mc:Choice Requires="p14">
       <p:transition spd="slow" p14:dur="2000"/>
     </mc:Choice>
-    <mc:Fallback>
+    <mc:Fallback xmlns="">
       <p:transition xmlns:p14="http://schemas.microsoft.com/office/powerpoint/2010/main" spd="slow"/>
     </mc:Fallback>
   </mc:AlternateContent>
+  <p:timing>
+    <p:tnLst>
+      <p:par>
+        <p:cTn xmlns:p14="http://schemas.microsoft.com/office/powerpoint/2010/main" id="1" dur="indefinite" restart="never" nodeType="tmRoot"/>
+      </p:par>
+    </p:tnLst>
+  </p:timing>
 </p:sld>
 </file>
 
@@ -8287,14 +8364,21 @@
   <p:clrMapOvr>
     <a:masterClrMapping/>
   </p:clrMapOvr>
-  <mc:AlternateContent xmlns:mc="http://schemas.openxmlformats.org/markup-compatibility/2006">
-    <mc:Choice xmlns:p14="http://schemas.microsoft.com/office/powerpoint/2010/main" Requires="p14">
+  <mc:AlternateContent xmlns:mc="http://schemas.openxmlformats.org/markup-compatibility/2006" xmlns:p14="http://schemas.microsoft.com/office/powerpoint/2010/main">
+    <mc:Choice Requires="p14">
       <p:transition spd="slow" p14:dur="2000"/>
     </mc:Choice>
-    <mc:Fallback>
+    <mc:Fallback xmlns="">
       <p:transition xmlns:p14="http://schemas.microsoft.com/office/powerpoint/2010/main" spd="slow"/>
     </mc:Fallback>
   </mc:AlternateContent>
+  <p:timing>
+    <p:tnLst>
+      <p:par>
+        <p:cTn xmlns:p14="http://schemas.microsoft.com/office/powerpoint/2010/main" id="1" dur="indefinite" restart="never" nodeType="tmRoot"/>
+      </p:par>
+    </p:tnLst>
+  </p:timing>
 </p:sld>
 </file>
 
@@ -8435,14 +8519,21 @@
   <p:clrMapOvr>
     <a:masterClrMapping/>
   </p:clrMapOvr>
-  <mc:AlternateContent xmlns:mc="http://schemas.openxmlformats.org/markup-compatibility/2006">
-    <mc:Choice xmlns:p14="http://schemas.microsoft.com/office/powerpoint/2010/main" Requires="p14">
+  <mc:AlternateContent xmlns:mc="http://schemas.openxmlformats.org/markup-compatibility/2006" xmlns:p14="http://schemas.microsoft.com/office/powerpoint/2010/main">
+    <mc:Choice Requires="p14">
       <p:transition spd="slow" p14:dur="2000"/>
     </mc:Choice>
-    <mc:Fallback>
+    <mc:Fallback xmlns="">
       <p:transition xmlns:p14="http://schemas.microsoft.com/office/powerpoint/2010/main" spd="slow"/>
     </mc:Fallback>
   </mc:AlternateContent>
+  <p:timing>
+    <p:tnLst>
+      <p:par>
+        <p:cTn xmlns:p14="http://schemas.microsoft.com/office/powerpoint/2010/main" id="1" dur="indefinite" restart="never" nodeType="tmRoot"/>
+      </p:par>
+    </p:tnLst>
+  </p:timing>
 </p:sld>
 </file>
 
@@ -8504,6 +8595,13 @@
       <p:transition xmlns:p14="http://schemas.microsoft.com/office/powerpoint/2010/main" spd="slow"/>
     </mc:Fallback>
   </mc:AlternateContent>
+  <p:timing>
+    <p:tnLst>
+      <p:par>
+        <p:cTn xmlns:p14="http://schemas.microsoft.com/office/powerpoint/2010/main" id="1" dur="indefinite" restart="never" nodeType="tmRoot"/>
+      </p:par>
+    </p:tnLst>
+  </p:timing>
 </p:sld>
 </file>
 
@@ -8599,14 +8697,21 @@
   <p:clrMapOvr>
     <a:masterClrMapping/>
   </p:clrMapOvr>
-  <mc:AlternateContent xmlns:mc="http://schemas.openxmlformats.org/markup-compatibility/2006">
-    <mc:Choice xmlns:p14="http://schemas.microsoft.com/office/powerpoint/2010/main" Requires="p14">
+  <mc:AlternateContent xmlns:mc="http://schemas.openxmlformats.org/markup-compatibility/2006" xmlns:p14="http://schemas.microsoft.com/office/powerpoint/2010/main">
+    <mc:Choice Requires="p14">
       <p:transition spd="slow" p14:dur="2000"/>
     </mc:Choice>
-    <mc:Fallback>
+    <mc:Fallback xmlns="">
       <p:transition xmlns:p14="http://schemas.microsoft.com/office/powerpoint/2010/main" spd="slow"/>
     </mc:Fallback>
   </mc:AlternateContent>
+  <p:timing>
+    <p:tnLst>
+      <p:par>
+        <p:cTn xmlns:p14="http://schemas.microsoft.com/office/powerpoint/2010/main" id="1" dur="indefinite" restart="never" nodeType="tmRoot"/>
+      </p:par>
+    </p:tnLst>
+  </p:timing>
 </p:sld>
 </file>
 
@@ -8742,14 +8847,21 @@
   <p:clrMapOvr>
     <a:masterClrMapping/>
   </p:clrMapOvr>
-  <mc:AlternateContent xmlns:mc="http://schemas.openxmlformats.org/markup-compatibility/2006">
-    <mc:Choice xmlns:p14="http://schemas.microsoft.com/office/powerpoint/2010/main" Requires="p14">
+  <mc:AlternateContent xmlns:mc="http://schemas.openxmlformats.org/markup-compatibility/2006" xmlns:p14="http://schemas.microsoft.com/office/powerpoint/2010/main">
+    <mc:Choice Requires="p14">
       <p:transition spd="slow" p14:dur="2000"/>
     </mc:Choice>
-    <mc:Fallback>
+    <mc:Fallback xmlns="">
       <p:transition xmlns:p14="http://schemas.microsoft.com/office/powerpoint/2010/main" spd="slow"/>
     </mc:Fallback>
   </mc:AlternateContent>
+  <p:timing>
+    <p:tnLst>
+      <p:par>
+        <p:cTn xmlns:p14="http://schemas.microsoft.com/office/powerpoint/2010/main" id="1" dur="indefinite" restart="never" nodeType="tmRoot"/>
+      </p:par>
+    </p:tnLst>
+  </p:timing>
 </p:sld>
 </file>
 
@@ -8811,6 +8923,13 @@
       <p:transition xmlns:p14="http://schemas.microsoft.com/office/powerpoint/2010/main" spd="slow"/>
     </mc:Fallback>
   </mc:AlternateContent>
+  <p:timing>
+    <p:tnLst>
+      <p:par>
+        <p:cTn xmlns:p14="http://schemas.microsoft.com/office/powerpoint/2010/main" id="1" dur="indefinite" restart="never" nodeType="tmRoot"/>
+      </p:par>
+    </p:tnLst>
+  </p:timing>
 </p:sld>
 </file>
 
@@ -8965,14 +9084,21 @@
   <p:clrMapOvr>
     <a:masterClrMapping/>
   </p:clrMapOvr>
-  <mc:AlternateContent xmlns:mc="http://schemas.openxmlformats.org/markup-compatibility/2006">
-    <mc:Choice xmlns:p14="http://schemas.microsoft.com/office/powerpoint/2010/main" Requires="p14">
+  <mc:AlternateContent xmlns:mc="http://schemas.openxmlformats.org/markup-compatibility/2006" xmlns:p14="http://schemas.microsoft.com/office/powerpoint/2010/main">
+    <mc:Choice Requires="p14">
       <p:transition spd="slow" p14:dur="2000"/>
     </mc:Choice>
-    <mc:Fallback>
+    <mc:Fallback xmlns="">
       <p:transition xmlns:p14="http://schemas.microsoft.com/office/powerpoint/2010/main" spd="slow"/>
     </mc:Fallback>
   </mc:AlternateContent>
+  <p:timing>
+    <p:tnLst>
+      <p:par>
+        <p:cTn xmlns:p14="http://schemas.microsoft.com/office/powerpoint/2010/main" id="1" dur="indefinite" restart="never" nodeType="tmRoot"/>
+      </p:par>
+    </p:tnLst>
+  </p:timing>
 </p:sld>
 </file>
 
@@ -9112,14 +9238,21 @@
   <p:clrMapOvr>
     <a:masterClrMapping/>
   </p:clrMapOvr>
-  <mc:AlternateContent xmlns:mc="http://schemas.openxmlformats.org/markup-compatibility/2006">
-    <mc:Choice xmlns:p14="http://schemas.microsoft.com/office/powerpoint/2010/main" Requires="p14">
+  <mc:AlternateContent xmlns:mc="http://schemas.openxmlformats.org/markup-compatibility/2006" xmlns:p14="http://schemas.microsoft.com/office/powerpoint/2010/main">
+    <mc:Choice Requires="p14">
       <p:transition spd="slow" p14:dur="2000"/>
     </mc:Choice>
-    <mc:Fallback>
+    <mc:Fallback xmlns="">
       <p:transition xmlns:p14="http://schemas.microsoft.com/office/powerpoint/2010/main" spd="slow"/>
     </mc:Fallback>
   </mc:AlternateContent>
+  <p:timing>
+    <p:tnLst>
+      <p:par>
+        <p:cTn xmlns:p14="http://schemas.microsoft.com/office/powerpoint/2010/main" id="1" dur="indefinite" restart="never" nodeType="tmRoot"/>
+      </p:par>
+    </p:tnLst>
+  </p:timing>
 </p:sld>
 </file>
 
@@ -9235,14 +9368,21 @@
   <p:clrMapOvr>
     <a:masterClrMapping/>
   </p:clrMapOvr>
-  <mc:AlternateContent xmlns:mc="http://schemas.openxmlformats.org/markup-compatibility/2006">
-    <mc:Choice xmlns:p14="http://schemas.microsoft.com/office/powerpoint/2010/main" Requires="p14">
+  <mc:AlternateContent xmlns:mc="http://schemas.openxmlformats.org/markup-compatibility/2006" xmlns:p14="http://schemas.microsoft.com/office/powerpoint/2010/main">
+    <mc:Choice Requires="p14">
       <p:transition spd="slow" p14:dur="2000"/>
     </mc:Choice>
-    <mc:Fallback>
+    <mc:Fallback xmlns="">
       <p:transition xmlns:p14="http://schemas.microsoft.com/office/powerpoint/2010/main" spd="slow"/>
     </mc:Fallback>
   </mc:AlternateContent>
+  <p:timing>
+    <p:tnLst>
+      <p:par>
+        <p:cTn xmlns:p14="http://schemas.microsoft.com/office/powerpoint/2010/main" id="1" dur="indefinite" restart="never" nodeType="tmRoot"/>
+      </p:par>
+    </p:tnLst>
+  </p:timing>
 </p:sld>
 </file>
 
@@ -9304,87 +9444,103 @@
           <a:lstStyle/>
           <a:p>
             <a:r>
-              <a:rPr lang="en-US" smtClean="0"/>
+              <a:rPr lang="en-US" dirty="0" smtClean="0"/>
               <a:t>Day 1: </a:t>
             </a:r>
             <a:r>
-              <a:rPr lang="en-US" smtClean="0"/>
-              <a:t>10am – 5pm</a:t>
+              <a:rPr lang="en-US" dirty="0"/>
+              <a:t>9</a:t>
+            </a:r>
+            <a:r>
+              <a:rPr lang="en-US" dirty="0" smtClean="0"/>
+              <a:t>am </a:t>
+            </a:r>
+            <a:r>
+              <a:rPr lang="en-US" dirty="0" smtClean="0"/>
+              <a:t>– 5pm</a:t>
             </a:r>
           </a:p>
           <a:p>
             <a:pPr lvl="1"/>
             <a:r>
-              <a:rPr lang="en-US" smtClean="0"/>
+              <a:rPr lang="en-US" dirty="0" smtClean="0"/>
               <a:t>Introduction to SharePoint 2013 Workflow:</a:t>
             </a:r>
           </a:p>
           <a:p>
             <a:pPr lvl="1"/>
             <a:r>
-              <a:rPr lang="en-US" smtClean="0"/>
+              <a:rPr lang="en-US" dirty="0" smtClean="0"/>
               <a:t>Developing Workflows with with Visual Studio</a:t>
             </a:r>
           </a:p>
           <a:p>
             <a:pPr lvl="1"/>
             <a:r>
-              <a:rPr lang="en-US" smtClean="0"/>
+              <a:rPr lang="en-US" dirty="0" smtClean="0"/>
               <a:t>Working with Tasks &amp; Outcomes</a:t>
             </a:r>
           </a:p>
           <a:p>
             <a:pPr lvl="1"/>
             <a:r>
-              <a:rPr lang="en-US" smtClean="0"/>
+              <a:rPr lang="en-US" dirty="0" smtClean="0"/>
               <a:t>Workflow Types</a:t>
             </a:r>
           </a:p>
           <a:p>
             <a:pPr lvl="1"/>
             <a:r>
-              <a:rPr lang="en-US" smtClean="0"/>
+              <a:rPr lang="en-US" dirty="0" smtClean="0"/>
               <a:t>Workflow Services CSOM</a:t>
             </a:r>
           </a:p>
           <a:p>
             <a:r>
-              <a:rPr lang="en-US" smtClean="0"/>
-              <a:t>Day 2: 10am – 5pm</a:t>
+              <a:rPr lang="en-US" dirty="0" smtClean="0"/>
+              <a:t>Day 2: </a:t>
+            </a:r>
+            <a:r>
+              <a:rPr lang="en-US" dirty="0" smtClean="0"/>
+              <a:t>9am </a:t>
+            </a:r>
+            <a:r>
+              <a:rPr lang="en-US" dirty="0" smtClean="0"/>
+              <a:t>– 5pm</a:t>
             </a:r>
           </a:p>
           <a:p>
             <a:pPr lvl="1"/>
             <a:r>
-              <a:rPr lang="en-US" smtClean="0"/>
+              <a:rPr lang="en-US" dirty="0" smtClean="0"/>
               <a:t>Custom Forms</a:t>
             </a:r>
           </a:p>
           <a:p>
             <a:pPr lvl="1"/>
             <a:r>
-              <a:rPr lang="en-US" smtClean="0"/>
+              <a:rPr lang="en-US" dirty="0" smtClean="0"/>
               <a:t>Custom Activities &amp; Actions</a:t>
             </a:r>
           </a:p>
           <a:p>
             <a:pPr lvl="1"/>
             <a:r>
-              <a:rPr lang="en-US" smtClean="0"/>
+              <a:rPr lang="en-US" dirty="0" smtClean="0"/>
               <a:t>Working with Anon Web Services</a:t>
             </a:r>
           </a:p>
           <a:p>
             <a:pPr lvl="1"/>
             <a:r>
-              <a:rPr lang="en-US" smtClean="0"/>
+              <a:rPr lang="en-US" dirty="0" smtClean="0"/>
               <a:t>Working with with SharePoint REST API from Workflows</a:t>
             </a:r>
           </a:p>
           <a:p>
             <a:pPr lvl="1"/>
             <a:r>
-              <a:rPr lang="en-US" smtClean="0"/>
+              <a:rPr lang="en-US" dirty="0" smtClean="0"/>
               <a:t>Working with Secured Web Services</a:t>
             </a:r>
           </a:p>
@@ -9404,6 +9560,13 @@
   <p:clrMapOvr>
     <a:masterClrMapping/>
   </p:clrMapOvr>
+  <p:timing>
+    <p:tnLst>
+      <p:par>
+        <p:cTn xmlns:p14="http://schemas.microsoft.com/office/powerpoint/2010/main" id="1" dur="indefinite" restart="never" nodeType="tmRoot"/>
+      </p:par>
+    </p:tnLst>
+  </p:timing>
 </p:sld>
 </file>
 
@@ -9465,6 +9628,13 @@
       <p:transition xmlns:p14="http://schemas.microsoft.com/office/powerpoint/2010/main" spd="slow"/>
     </mc:Fallback>
   </mc:AlternateContent>
+  <p:timing>
+    <p:tnLst>
+      <p:par>
+        <p:cTn xmlns:p14="http://schemas.microsoft.com/office/powerpoint/2010/main" id="1" dur="indefinite" restart="never" nodeType="tmRoot"/>
+      </p:par>
+    </p:tnLst>
+  </p:timing>
 </p:sld>
 </file>
 
@@ -9570,14 +9740,21 @@
   <p:clrMapOvr>
     <a:masterClrMapping/>
   </p:clrMapOvr>
-  <mc:AlternateContent xmlns:mc="http://schemas.openxmlformats.org/markup-compatibility/2006">
-    <mc:Choice xmlns:p14="http://schemas.microsoft.com/office/powerpoint/2010/main" Requires="p14">
+  <mc:AlternateContent xmlns:mc="http://schemas.openxmlformats.org/markup-compatibility/2006" xmlns:p14="http://schemas.microsoft.com/office/powerpoint/2010/main">
+    <mc:Choice Requires="p14">
       <p:transition spd="slow" p14:dur="2000"/>
     </mc:Choice>
-    <mc:Fallback>
+    <mc:Fallback xmlns="">
       <p:transition xmlns:p14="http://schemas.microsoft.com/office/powerpoint/2010/main" spd="slow"/>
     </mc:Fallback>
   </mc:AlternateContent>
+  <p:timing>
+    <p:tnLst>
+      <p:par>
+        <p:cTn xmlns:p14="http://schemas.microsoft.com/office/powerpoint/2010/main" id="1" dur="indefinite" restart="never" nodeType="tmRoot"/>
+      </p:par>
+    </p:tnLst>
+  </p:timing>
 </p:sld>
 </file>
 
@@ -9656,7 +9833,6 @@
               <a:rPr lang="en-US" dirty="0" smtClean="0"/>
               <a:t>Initiation Form</a:t>
             </a:r>
-            <a:endParaRPr lang="en-US" dirty="0" smtClean="0"/>
           </a:p>
           <a:p>
             <a:r>
@@ -9713,14 +9889,21 @@
   <p:clrMapOvr>
     <a:masterClrMapping/>
   </p:clrMapOvr>
-  <mc:AlternateContent xmlns:mc="http://schemas.openxmlformats.org/markup-compatibility/2006">
-    <mc:Choice xmlns:p14="http://schemas.microsoft.com/office/powerpoint/2010/main" Requires="p14">
+  <mc:AlternateContent xmlns:mc="http://schemas.openxmlformats.org/markup-compatibility/2006" xmlns:p14="http://schemas.microsoft.com/office/powerpoint/2010/main">
+    <mc:Choice Requires="p14">
       <p:transition spd="slow" p14:dur="2000"/>
     </mc:Choice>
-    <mc:Fallback>
+    <mc:Fallback xmlns="">
       <p:transition xmlns:p14="http://schemas.microsoft.com/office/powerpoint/2010/main" spd="slow"/>
     </mc:Fallback>
   </mc:AlternateContent>
+  <p:timing>
+    <p:tnLst>
+      <p:par>
+        <p:cTn xmlns:p14="http://schemas.microsoft.com/office/powerpoint/2010/main" id="1" dur="indefinite" restart="never" nodeType="tmRoot"/>
+      </p:par>
+    </p:tnLst>
+  </p:timing>
 </p:sld>
 </file>
 
@@ -9823,14 +10006,21 @@
   <p:clrMapOvr>
     <a:masterClrMapping/>
   </p:clrMapOvr>
-  <mc:AlternateContent xmlns:mc="http://schemas.openxmlformats.org/markup-compatibility/2006">
-    <mc:Choice xmlns:p14="http://schemas.microsoft.com/office/powerpoint/2010/main" Requires="p14">
+  <mc:AlternateContent xmlns:mc="http://schemas.openxmlformats.org/markup-compatibility/2006" xmlns:p14="http://schemas.microsoft.com/office/powerpoint/2010/main">
+    <mc:Choice Requires="p14">
       <p:transition spd="slow" p14:dur="2000"/>
     </mc:Choice>
-    <mc:Fallback>
+    <mc:Fallback xmlns="">
       <p:transition xmlns:p14="http://schemas.microsoft.com/office/powerpoint/2010/main" spd="slow"/>
     </mc:Fallback>
   </mc:AlternateContent>
+  <p:timing>
+    <p:tnLst>
+      <p:par>
+        <p:cTn xmlns:p14="http://schemas.microsoft.com/office/powerpoint/2010/main" id="1" dur="indefinite" restart="never" nodeType="tmRoot"/>
+      </p:par>
+    </p:tnLst>
+  </p:timing>
 </p:sld>
 </file>
 
@@ -9939,14 +10129,21 @@
   <p:clrMapOvr>
     <a:masterClrMapping/>
   </p:clrMapOvr>
-  <mc:AlternateContent xmlns:mc="http://schemas.openxmlformats.org/markup-compatibility/2006">
-    <mc:Choice xmlns:p14="http://schemas.microsoft.com/office/powerpoint/2010/main" Requires="p14">
+  <mc:AlternateContent xmlns:mc="http://schemas.openxmlformats.org/markup-compatibility/2006" xmlns:p14="http://schemas.microsoft.com/office/powerpoint/2010/main">
+    <mc:Choice Requires="p14">
       <p:transition spd="slow" p14:dur="2000"/>
     </mc:Choice>
-    <mc:Fallback>
+    <mc:Fallback xmlns="">
       <p:transition xmlns:p14="http://schemas.microsoft.com/office/powerpoint/2010/main" spd="slow"/>
     </mc:Fallback>
   </mc:AlternateContent>
+  <p:timing>
+    <p:tnLst>
+      <p:par>
+        <p:cTn xmlns:p14="http://schemas.microsoft.com/office/powerpoint/2010/main" id="1" dur="indefinite" restart="never" nodeType="tmRoot"/>
+      </p:par>
+    </p:tnLst>
+  </p:timing>
 </p:sld>
 </file>
 
@@ -10008,6 +10205,13 @@
       <p:transition xmlns:p14="http://schemas.microsoft.com/office/powerpoint/2010/main" spd="slow"/>
     </mc:Fallback>
   </mc:AlternateContent>
+  <p:timing>
+    <p:tnLst>
+      <p:par>
+        <p:cTn xmlns:p14="http://schemas.microsoft.com/office/powerpoint/2010/main" id="1" dur="indefinite" restart="never" nodeType="tmRoot"/>
+      </p:par>
+    </p:tnLst>
+  </p:timing>
 </p:sld>
 </file>
 

</xml_diff>